<commit_message>
Added my parts to Readme and PPT
</commit_message>
<xml_diff>
--- a/Retrospective.pptx
+++ b/Retrospective.pptx
@@ -3128,14 +3128,14 @@
           </a:ln>
           <a:extLst>
             <a:ext uri="{909E8E84-426E-40dd-AFC4-6F175D3DCCD1}">
-              <a14:hiddenFill xmlns="" xmlns:a14="http://schemas.microsoft.com/office/drawing/2010/main">
+              <a14:hiddenFill xmlns:a14="http://schemas.microsoft.com/office/drawing/2010/main" xmlns="">
                 <a:solidFill>
                   <a:srgbClr val="FFFFFF"/>
                 </a:solidFill>
               </a14:hiddenFill>
             </a:ext>
             <a:ext uri="{91240B29-F687-4f45-9708-019B960494DF}">
-              <a14:hiddenLine xmlns="" xmlns:a14="http://schemas.microsoft.com/office/drawing/2010/main" w="9525">
+              <a14:hiddenLine xmlns:a14="http://schemas.microsoft.com/office/drawing/2010/main" xmlns="" w="9525">
                 <a:solidFill>
                   <a:srgbClr val="000000"/>
                 </a:solidFill>
@@ -3186,14 +3186,14 @@
           </a:ln>
           <a:extLst>
             <a:ext uri="{909E8E84-426E-40dd-AFC4-6F175D3DCCD1}">
-              <a14:hiddenFill xmlns="" xmlns:a14="http://schemas.microsoft.com/office/drawing/2010/main">
+              <a14:hiddenFill xmlns:a14="http://schemas.microsoft.com/office/drawing/2010/main" xmlns="">
                 <a:solidFill>
                   <a:srgbClr val="FFFFFF"/>
                 </a:solidFill>
               </a14:hiddenFill>
             </a:ext>
             <a:ext uri="{91240B29-F687-4f45-9708-019B960494DF}">
-              <a14:hiddenLine xmlns="" xmlns:a14="http://schemas.microsoft.com/office/drawing/2010/main" w="9525">
+              <a14:hiddenLine xmlns:a14="http://schemas.microsoft.com/office/drawing/2010/main" xmlns="" w="9525">
                 <a:solidFill>
                   <a:srgbClr val="000000"/>
                 </a:solidFill>
@@ -4056,7 +4056,7 @@
           <p:cNvPr id="2" name="Title 1">
             <a:extLst>
               <a:ext uri="{FF2B5EF4-FFF2-40B4-BE49-F238E27FC236}">
-                <a16:creationId xmlns:a16="http://schemas.microsoft.com/office/drawing/2014/main" id="{B448FC6D-82F5-4A1A-B2E1-9EB144635D34}"/>
+                <a16:creationId xmlns:a16="http://schemas.microsoft.com/office/drawing/2014/main" xmlns="" id="{B448FC6D-82F5-4A1A-B2E1-9EB144635D34}"/>
               </a:ext>
             </a:extLst>
           </p:cNvPr>
@@ -4084,7 +4084,7 @@
           <p:cNvPr id="3" name="Content Placeholder 2">
             <a:extLst>
               <a:ext uri="{FF2B5EF4-FFF2-40B4-BE49-F238E27FC236}">
-                <a16:creationId xmlns:a16="http://schemas.microsoft.com/office/drawing/2014/main" id="{9AFDB800-3477-4AD9-91AC-DF1379F5E777}"/>
+                <a16:creationId xmlns:a16="http://schemas.microsoft.com/office/drawing/2014/main" xmlns="" id="{9AFDB800-3477-4AD9-91AC-DF1379F5E777}"/>
               </a:ext>
             </a:extLst>
           </p:cNvPr>
@@ -4146,8 +4146,9 @@
             <a:pPr lvl="1"/>
             <a:r>
               <a:rPr lang="en-US" dirty="0"/>
-              <a:t>Joel-</a:t>
-            </a:r>
+              <a:t>Joel- Research what resources are available online to help my coding</a:t>
+            </a:r>
+            <a:endParaRPr lang="en-US" dirty="0"/>
           </a:p>
           <a:p>
             <a:pPr lvl="1"/>
@@ -4193,7 +4194,7 @@
           <p:cNvPr id="2" name="Title 1">
             <a:extLst>
               <a:ext uri="{FF2B5EF4-FFF2-40B4-BE49-F238E27FC236}">
-                <a16:creationId xmlns:a16="http://schemas.microsoft.com/office/drawing/2014/main" id="{04A61DEE-1E26-4350-B394-19624F1AC70A}"/>
+                <a16:creationId xmlns:a16="http://schemas.microsoft.com/office/drawing/2014/main" xmlns="" id="{04A61DEE-1E26-4350-B394-19624F1AC70A}"/>
               </a:ext>
             </a:extLst>
           </p:cNvPr>
@@ -4218,7 +4219,7 @@
           <p:cNvPr id="3" name="Content Placeholder 2">
             <a:extLst>
               <a:ext uri="{FF2B5EF4-FFF2-40B4-BE49-F238E27FC236}">
-                <a16:creationId xmlns:a16="http://schemas.microsoft.com/office/drawing/2014/main" id="{D320F8E7-647F-4EFC-B9B4-4B9F37EFE90E}"/>
+                <a16:creationId xmlns:a16="http://schemas.microsoft.com/office/drawing/2014/main" xmlns="" id="{D320F8E7-647F-4EFC-B9B4-4B9F37EFE90E}"/>
               </a:ext>
             </a:extLst>
           </p:cNvPr>
@@ -4302,7 +4303,7 @@
           <p:cNvPr id="2" name="Title 1">
             <a:extLst>
               <a:ext uri="{FF2B5EF4-FFF2-40B4-BE49-F238E27FC236}">
-                <a16:creationId xmlns:a16="http://schemas.microsoft.com/office/drawing/2014/main" id="{6004FE9F-E52C-4616-AE5F-80D2F7638161}"/>
+                <a16:creationId xmlns:a16="http://schemas.microsoft.com/office/drawing/2014/main" xmlns="" id="{6004FE9F-E52C-4616-AE5F-80D2F7638161}"/>
               </a:ext>
             </a:extLst>
           </p:cNvPr>
@@ -4327,7 +4328,7 @@
           <p:cNvPr id="3" name="Content Placeholder 2">
             <a:extLst>
               <a:ext uri="{FF2B5EF4-FFF2-40B4-BE49-F238E27FC236}">
-                <a16:creationId xmlns:a16="http://schemas.microsoft.com/office/drawing/2014/main" id="{387168AA-A1A9-490F-A00E-A7403ABAB153}"/>
+                <a16:creationId xmlns:a16="http://schemas.microsoft.com/office/drawing/2014/main" xmlns="" id="{387168AA-A1A9-490F-A00E-A7403ABAB153}"/>
               </a:ext>
             </a:extLst>
           </p:cNvPr>
@@ -4369,8 +4370,9 @@
             <a:pPr lvl="1"/>
             <a:r>
               <a:rPr lang="en-US" dirty="0"/>
-              <a:t>Joel-</a:t>
-            </a:r>
+              <a:t>Joel- I need to start looking at other Twitch bot API's so that I can see what goals I can achieve in regards to the functionality of the Twitch bot code.</a:t>
+            </a:r>
+            <a:endParaRPr lang="en-US" dirty="0"/>
           </a:p>
           <a:p>
             <a:pPr lvl="1"/>

</xml_diff>